<commit_message>
Update ppt - lf(B)
</commit_message>
<xml_diff>
--- a/Doc/PowerPoint/macro.pptx
+++ b/Doc/PowerPoint/macro.pptx
@@ -8,9 +8,10 @@
     <p:sldId id="257" r:id="rId5"/>
     <p:sldId id="261" r:id="rId6"/>
     <p:sldId id="262" r:id="rId7"/>
-    <p:sldId id="258" r:id="rId8"/>
-    <p:sldId id="259" r:id="rId9"/>
-    <p:sldId id="260" r:id="rId10"/>
+    <p:sldId id="263" r:id="rId8"/>
+    <p:sldId id="258" r:id="rId9"/>
+    <p:sldId id="259" r:id="rId10"/>
+    <p:sldId id="260" r:id="rId11"/>
   </p:sldIdLst>
   <p:sldSz cx="12192000" cy="6858000"/>
   <p:notesSz cx="6858000" cy="9144000"/>
@@ -4671,6 +4672,428 @@
           <p:cNvPr id="2" name="제목 1">
             <a:extLst>
               <a:ext uri="{FF2B5EF4-FFF2-40B4-BE49-F238E27FC236}">
+                <a16:creationId xmlns:a16="http://schemas.microsoft.com/office/drawing/2014/main" id="{0601704C-4A30-C7EC-BEB8-529B79D5A475}"/>
+              </a:ext>
+            </a:extLst>
+          </p:cNvPr>
+          <p:cNvSpPr>
+            <a:spLocks noGrp="1"/>
+          </p:cNvSpPr>
+          <p:nvPr>
+            <p:ph type="title"/>
+          </p:nvPr>
+        </p:nvSpPr>
+        <p:spPr/>
+        <p:txBody>
+          <a:bodyPr/>
+          <a:lstStyle/>
+          <a:p>
+            <a:r>
+              <a:rPr lang="en-US" altLang="ko-KR" b="1" dirty="0"/>
+              <a:t>A &gt; @lf(B) &lt;| C;</a:t>
+            </a:r>
+            <a:endParaRPr lang="ko-KR" altLang="en-US" dirty="0"/>
+          </a:p>
+        </p:txBody>
+      </p:sp>
+      <p:sp>
+        <p:nvSpPr>
+          <p:cNvPr id="3" name="내용 개체 틀 2">
+            <a:extLst>
+              <a:ext uri="{FF2B5EF4-FFF2-40B4-BE49-F238E27FC236}">
+                <a16:creationId xmlns:a16="http://schemas.microsoft.com/office/drawing/2014/main" id="{56614C05-54BE-6B11-EF3F-9072D7158179}"/>
+              </a:ext>
+            </a:extLst>
+          </p:cNvPr>
+          <p:cNvSpPr>
+            <a:spLocks noGrp="1"/>
+          </p:cNvSpPr>
+          <p:nvPr>
+            <p:ph idx="1"/>
+          </p:nvPr>
+        </p:nvSpPr>
+        <p:spPr/>
+        <p:txBody>
+          <a:bodyPr/>
+          <a:lstStyle/>
+          <a:p>
+            <a:r>
+              <a:rPr lang="en-US" altLang="ko-KR" dirty="0"/>
+              <a:t>#latch( #(A), #g(B)) &gt; B;</a:t>
+            </a:r>
+          </a:p>
+          <a:p>
+            <a:r>
+              <a:rPr lang="en-US" altLang="ko-KR" dirty="0"/>
+              <a:t>#latch( #(C), #h(B)) |&gt; B;</a:t>
+            </a:r>
+          </a:p>
+          <a:p>
+            <a:endParaRPr lang="en-US" altLang="ko-KR" dirty="0"/>
+          </a:p>
+          <a:p>
+            <a:endParaRPr lang="en-US" altLang="ko-KR" dirty="0"/>
+          </a:p>
+          <a:p>
+            <a:endParaRPr lang="en-US" altLang="ko-KR" dirty="0"/>
+          </a:p>
+          <a:p>
+            <a:r>
+              <a:rPr lang="en-US" altLang="ko-KR" dirty="0"/>
+              <a:t>(n = #(A) or #(B)) (#M = #g(B) or #h(B))</a:t>
+            </a:r>
+          </a:p>
+          <a:p>
+            <a:r>
+              <a:rPr lang="ko-KR" altLang="en-US" dirty="0"/>
+              <a:t>행위 </a:t>
+            </a:r>
+            <a:r>
+              <a:rPr lang="en-US" altLang="ko-KR" dirty="0"/>
+              <a:t>B</a:t>
+            </a:r>
+            <a:r>
+              <a:rPr lang="ko-KR" altLang="en-US" dirty="0"/>
+              <a:t>는 </a:t>
+            </a:r>
+            <a:r>
+              <a:rPr lang="en-US" altLang="ko-KR" dirty="0"/>
+              <a:t>#latch (n, #M )</a:t>
+            </a:r>
+            <a:r>
+              <a:rPr lang="ko-KR" altLang="en-US" dirty="0"/>
+              <a:t>의 값이 </a:t>
+            </a:r>
+            <a:r>
+              <a:rPr lang="en-US" altLang="ko-KR" dirty="0"/>
+              <a:t>'True'</a:t>
+            </a:r>
+            <a:r>
+              <a:rPr lang="ko-KR" altLang="en-US" dirty="0"/>
+              <a:t>일 때 실행되며</a:t>
+            </a:r>
+            <a:r>
+              <a:rPr lang="en-US" altLang="ko-KR" dirty="0"/>
+              <a:t>, '</a:t>
+            </a:r>
+            <a:r>
+              <a:rPr lang="ko-KR" altLang="en-US" dirty="0"/>
+              <a:t>사용자가 설정한 </a:t>
+            </a:r>
+            <a:r>
+              <a:rPr lang="en-US" altLang="ko-KR" dirty="0"/>
+              <a:t>#M</a:t>
+            </a:r>
+            <a:r>
+              <a:rPr lang="ko-KR" altLang="en-US" dirty="0"/>
+              <a:t>에 의해</a:t>
+            </a:r>
+            <a:r>
+              <a:rPr lang="en-US" altLang="ko-KR" dirty="0"/>
+              <a:t>' </a:t>
+            </a:r>
+            <a:r>
+              <a:rPr lang="ko-KR" altLang="en-US" dirty="0" err="1"/>
+              <a:t>실행중에</a:t>
+            </a:r>
+            <a:r>
+              <a:rPr lang="ko-KR" altLang="en-US" dirty="0"/>
+              <a:t> </a:t>
+            </a:r>
+            <a:r>
+              <a:rPr lang="en-US" altLang="ko-KR" dirty="0"/>
+              <a:t>#latch (n)</a:t>
+            </a:r>
+            <a:r>
+              <a:rPr lang="ko-KR" altLang="en-US" dirty="0"/>
+              <a:t>의 값을 </a:t>
+            </a:r>
+            <a:r>
+              <a:rPr lang="ko-KR" altLang="en-US" dirty="0" err="1"/>
+              <a:t>리셋함</a:t>
+            </a:r>
+            <a:endParaRPr lang="en-US" altLang="ko-KR" dirty="0"/>
+          </a:p>
+          <a:p>
+            <a:endParaRPr lang="en-US" altLang="ko-KR" dirty="0"/>
+          </a:p>
+          <a:p>
+            <a:endParaRPr lang="ko-KR" altLang="en-US" dirty="0"/>
+          </a:p>
+        </p:txBody>
+      </p:sp>
+      <p:sp>
+        <p:nvSpPr>
+          <p:cNvPr id="5" name="타원 4">
+            <a:extLst>
+              <a:ext uri="{FF2B5EF4-FFF2-40B4-BE49-F238E27FC236}">
+                <a16:creationId xmlns:a16="http://schemas.microsoft.com/office/drawing/2014/main" id="{723B430E-4C8A-5718-71A0-3C0143D5C33C}"/>
+              </a:ext>
+            </a:extLst>
+          </p:cNvPr>
+          <p:cNvSpPr/>
+          <p:nvPr/>
+        </p:nvSpPr>
+        <p:spPr>
+          <a:xfrm>
+            <a:off x="9381339" y="2380153"/>
+            <a:ext cx="922789" cy="914400"/>
+          </a:xfrm>
+          <a:prstGeom prst="ellipse">
+            <a:avLst/>
+          </a:prstGeom>
+        </p:spPr>
+        <p:style>
+          <a:lnRef idx="2">
+            <a:schemeClr val="accent1">
+              <a:shade val="50000"/>
+            </a:schemeClr>
+          </a:lnRef>
+          <a:fillRef idx="1">
+            <a:schemeClr val="accent1"/>
+          </a:fillRef>
+          <a:effectRef idx="0">
+            <a:schemeClr val="accent1"/>
+          </a:effectRef>
+          <a:fontRef idx="minor">
+            <a:schemeClr val="lt1"/>
+          </a:fontRef>
+        </p:style>
+        <p:txBody>
+          <a:bodyPr rtlCol="0" anchor="ctr"/>
+          <a:lstStyle/>
+          <a:p>
+            <a:pPr algn="ctr"/>
+            <a:r>
+              <a:rPr lang="en-US" altLang="ko-KR" dirty="0"/>
+              <a:t>B</a:t>
+            </a:r>
+            <a:endParaRPr lang="ko-KR" altLang="en-US" dirty="0"/>
+          </a:p>
+        </p:txBody>
+      </p:sp>
+      <p:sp>
+        <p:nvSpPr>
+          <p:cNvPr id="6" name="TextBox 5">
+            <a:extLst>
+              <a:ext uri="{FF2B5EF4-FFF2-40B4-BE49-F238E27FC236}">
+                <a16:creationId xmlns:a16="http://schemas.microsoft.com/office/drawing/2014/main" id="{95E20B45-F2DB-EACE-1202-28A7688D8679}"/>
+              </a:ext>
+            </a:extLst>
+          </p:cNvPr>
+          <p:cNvSpPr txBox="1"/>
+          <p:nvPr/>
+        </p:nvSpPr>
+        <p:spPr>
+          <a:xfrm>
+            <a:off x="6096000" y="1640959"/>
+            <a:ext cx="2544660" cy="369332"/>
+          </a:xfrm>
+          <a:prstGeom prst="rect">
+            <a:avLst/>
+          </a:prstGeom>
+        </p:spPr>
+        <p:style>
+          <a:lnRef idx="2">
+            <a:schemeClr val="accent1"/>
+          </a:lnRef>
+          <a:fillRef idx="1">
+            <a:schemeClr val="lt1"/>
+          </a:fillRef>
+          <a:effectRef idx="0">
+            <a:schemeClr val="accent1"/>
+          </a:effectRef>
+          <a:fontRef idx="minor">
+            <a:schemeClr val="dk1"/>
+          </a:fontRef>
+        </p:style>
+        <p:txBody>
+          <a:bodyPr wrap="square" rtlCol="0">
+            <a:spAutoFit/>
+          </a:bodyPr>
+          <a:lstStyle/>
+          <a:p>
+            <a:pPr algn="ctr"/>
+            <a:r>
+              <a:rPr lang="en-US" altLang="ko-KR" dirty="0"/>
+              <a:t>#latch( #(A),#g(B))</a:t>
+            </a:r>
+            <a:endParaRPr lang="ko-KR" altLang="en-US" dirty="0"/>
+          </a:p>
+        </p:txBody>
+      </p:sp>
+      <p:cxnSp>
+        <p:nvCxnSpPr>
+          <p:cNvPr id="7" name="직선 화살표 연결선 6">
+            <a:extLst>
+              <a:ext uri="{FF2B5EF4-FFF2-40B4-BE49-F238E27FC236}">
+                <a16:creationId xmlns:a16="http://schemas.microsoft.com/office/drawing/2014/main" id="{43E89383-4FEB-27E8-6E3A-5B963B4274DE}"/>
+              </a:ext>
+            </a:extLst>
+          </p:cNvPr>
+          <p:cNvCxnSpPr>
+            <a:cxnSpLocks/>
+            <a:stCxn id="11" idx="3"/>
+            <a:endCxn id="5" idx="3"/>
+          </p:cNvCxnSpPr>
+          <p:nvPr/>
+        </p:nvCxnSpPr>
+        <p:spPr>
+          <a:xfrm flipV="1">
+            <a:off x="8640660" y="3160642"/>
+            <a:ext cx="875818" cy="932985"/>
+          </a:xfrm>
+          <a:prstGeom prst="straightConnector1">
+            <a:avLst/>
+          </a:prstGeom>
+          <a:ln>
+            <a:prstDash val="dash"/>
+            <a:tailEnd type="triangle"/>
+          </a:ln>
+        </p:spPr>
+        <p:style>
+          <a:lnRef idx="1">
+            <a:schemeClr val="accent1"/>
+          </a:lnRef>
+          <a:fillRef idx="0">
+            <a:schemeClr val="accent1"/>
+          </a:fillRef>
+          <a:effectRef idx="0">
+            <a:schemeClr val="accent1"/>
+          </a:effectRef>
+          <a:fontRef idx="minor">
+            <a:schemeClr val="tx1"/>
+          </a:fontRef>
+        </p:style>
+      </p:cxnSp>
+      <p:cxnSp>
+        <p:nvCxnSpPr>
+          <p:cNvPr id="8" name="직선 화살표 연결선 7">
+            <a:extLst>
+              <a:ext uri="{FF2B5EF4-FFF2-40B4-BE49-F238E27FC236}">
+                <a16:creationId xmlns:a16="http://schemas.microsoft.com/office/drawing/2014/main" id="{E23C689D-5BA2-8FBA-4EA3-DAB356D242C9}"/>
+              </a:ext>
+            </a:extLst>
+          </p:cNvPr>
+          <p:cNvCxnSpPr>
+            <a:cxnSpLocks/>
+            <a:stCxn id="6" idx="3"/>
+            <a:endCxn id="5" idx="1"/>
+          </p:cNvCxnSpPr>
+          <p:nvPr/>
+        </p:nvCxnSpPr>
+        <p:spPr>
+          <a:xfrm>
+            <a:off x="8640660" y="1825625"/>
+            <a:ext cx="875818" cy="688439"/>
+          </a:xfrm>
+          <a:prstGeom prst="straightConnector1">
+            <a:avLst/>
+          </a:prstGeom>
+          <a:ln>
+            <a:tailEnd type="triangle"/>
+          </a:ln>
+        </p:spPr>
+        <p:style>
+          <a:lnRef idx="1">
+            <a:schemeClr val="accent1"/>
+          </a:lnRef>
+          <a:fillRef idx="0">
+            <a:schemeClr val="accent1"/>
+          </a:fillRef>
+          <a:effectRef idx="0">
+            <a:schemeClr val="accent1"/>
+          </a:effectRef>
+          <a:fontRef idx="minor">
+            <a:schemeClr val="tx1"/>
+          </a:fontRef>
+        </p:style>
+      </p:cxnSp>
+      <p:sp>
+        <p:nvSpPr>
+          <p:cNvPr id="11" name="TextBox 10">
+            <a:extLst>
+              <a:ext uri="{FF2B5EF4-FFF2-40B4-BE49-F238E27FC236}">
+                <a16:creationId xmlns:a16="http://schemas.microsoft.com/office/drawing/2014/main" id="{82C1B447-DE6A-7724-92F1-4528F1FBBA41}"/>
+              </a:ext>
+            </a:extLst>
+          </p:cNvPr>
+          <p:cNvSpPr txBox="1"/>
+          <p:nvPr/>
+        </p:nvSpPr>
+        <p:spPr>
+          <a:xfrm>
+            <a:off x="6096000" y="3908961"/>
+            <a:ext cx="2544660" cy="369332"/>
+          </a:xfrm>
+          <a:prstGeom prst="rect">
+            <a:avLst/>
+          </a:prstGeom>
+        </p:spPr>
+        <p:style>
+          <a:lnRef idx="2">
+            <a:schemeClr val="accent1"/>
+          </a:lnRef>
+          <a:fillRef idx="1">
+            <a:schemeClr val="lt1"/>
+          </a:fillRef>
+          <a:effectRef idx="0">
+            <a:schemeClr val="accent1"/>
+          </a:effectRef>
+          <a:fontRef idx="minor">
+            <a:schemeClr val="dk1"/>
+          </a:fontRef>
+        </p:style>
+        <p:txBody>
+          <a:bodyPr wrap="square" rtlCol="0">
+            <a:spAutoFit/>
+          </a:bodyPr>
+          <a:lstStyle/>
+          <a:p>
+            <a:pPr algn="ctr"/>
+            <a:r>
+              <a:rPr lang="en-US" altLang="ko-KR" dirty="0"/>
+              <a:t>#latch( #(C), #h(B))</a:t>
+            </a:r>
+            <a:endParaRPr lang="ko-KR" altLang="en-US" dirty="0"/>
+          </a:p>
+        </p:txBody>
+      </p:sp>
+    </p:spTree>
+    <p:extLst>
+      <p:ext uri="{BB962C8B-B14F-4D97-AF65-F5344CB8AC3E}">
+        <p14:creationId xmlns:p14="http://schemas.microsoft.com/office/powerpoint/2010/main" val="3905001281"/>
+      </p:ext>
+    </p:extLst>
+  </p:cSld>
+  <p:clrMapOvr>
+    <a:masterClrMapping/>
+  </p:clrMapOvr>
+</p:sld>
+</file>
+
+<file path=ppt/slides/slide5.xml><?xml version="1.0" encoding="utf-8"?>
+<p:sld xmlns:a="http://schemas.openxmlformats.org/drawingml/2006/main" xmlns:r="http://schemas.openxmlformats.org/officeDocument/2006/relationships" xmlns:p="http://schemas.openxmlformats.org/presentationml/2006/main">
+  <p:cSld>
+    <p:spTree>
+      <p:nvGrpSpPr>
+        <p:cNvPr id="1" name=""/>
+        <p:cNvGrpSpPr/>
+        <p:nvPr/>
+      </p:nvGrpSpPr>
+      <p:grpSpPr>
+        <a:xfrm>
+          <a:off x="0" y="0"/>
+          <a:ext cx="0" cy="0"/>
+          <a:chOff x="0" y="0"/>
+          <a:chExt cx="0" cy="0"/>
+        </a:xfrm>
+      </p:grpSpPr>
+      <p:sp>
+        <p:nvSpPr>
+          <p:cNvPr id="2" name="제목 1">
+            <a:extLst>
+              <a:ext uri="{FF2B5EF4-FFF2-40B4-BE49-F238E27FC236}">
                 <a16:creationId xmlns:a16="http://schemas.microsoft.com/office/drawing/2014/main" id="{C6D59EFD-DF9C-A869-4255-0D7865F571E7}"/>
               </a:ext>
             </a:extLst>
@@ -4976,7 +5399,7 @@
 </p:sld>
 </file>
 
-<file path=ppt/slides/slide5.xml><?xml version="1.0" encoding="utf-8"?>
+<file path=ppt/slides/slide6.xml><?xml version="1.0" encoding="utf-8"?>
 <p:sld xmlns:a="http://schemas.openxmlformats.org/drawingml/2006/main" xmlns:r="http://schemas.openxmlformats.org/officeDocument/2006/relationships" xmlns:p="http://schemas.openxmlformats.org/presentationml/2006/main">
   <p:cSld>
     <p:spTree>
@@ -5214,7 +5637,7 @@
 </p:sld>
 </file>
 
-<file path=ppt/slides/slide6.xml><?xml version="1.0" encoding="utf-8"?>
+<file path=ppt/slides/slide7.xml><?xml version="1.0" encoding="utf-8"?>
 <p:sld xmlns:a="http://schemas.openxmlformats.org/drawingml/2006/main" xmlns:r="http://schemas.openxmlformats.org/officeDocument/2006/relationships" xmlns:p="http://schemas.openxmlformats.org/presentationml/2006/main">
   <p:cSld>
     <p:spTree>
@@ -5737,6 +6160,15 @@
 </file>
 
 <file path=customXml/item2.xml><?xml version="1.0" encoding="utf-8"?>
+<?mso-contentType ?>
+<FormTemplates xmlns="http://schemas.microsoft.com/sharepoint/v3/contenttype/forms">
+  <Display>DocumentLibraryForm</Display>
+  <Edit>DocumentLibraryForm</Edit>
+  <New>DocumentLibraryForm</New>
+</FormTemplates>
+</file>
+
+<file path=customXml/item3.xml><?xml version="1.0" encoding="utf-8"?>
 <ct:contentTypeSchema xmlns:ct="http://schemas.microsoft.com/office/2006/metadata/contentType" xmlns:ma="http://schemas.microsoft.com/office/2006/metadata/properties/metaAttributes" ct:_="" ma:_="" ma:contentTypeName="문서" ma:contentTypeID="0x010100CCDC7B2CC92B2E4F9EAD6B5F64D89946" ma:contentTypeVersion="10" ma:contentTypeDescription="새 문서를 만듭니다." ma:contentTypeScope="" ma:versionID="6b285ce8677c02d1b6911851f69796a4">
   <xsd:schema xmlns:xsd="http://www.w3.org/2001/XMLSchema" xmlns:xs="http://www.w3.org/2001/XMLSchema" xmlns:p="http://schemas.microsoft.com/office/2006/metadata/properties" xmlns:ns3="b1a51043-90a6-4d4d-9c96-5f4e735cff8b" xmlns:ns4="236c9c70-648c-4b13-9c6c-4267382de561" targetNamespace="http://schemas.microsoft.com/office/2006/metadata/properties" ma:root="true" ma:fieldsID="51f01effb9e0b0f7794244462605fab2" ns3:_="" ns4:_="">
     <xsd:import namespace="b1a51043-90a6-4d4d-9c96-5f4e735cff8b"/>
@@ -5939,15 +6371,6 @@
 </ct:contentTypeSchema>
 </file>
 
-<file path=customXml/item3.xml><?xml version="1.0" encoding="utf-8"?>
-<?mso-contentType ?>
-<FormTemplates xmlns="http://schemas.microsoft.com/sharepoint/v3/contenttype/forms">
-  <Display>DocumentLibraryForm</Display>
-  <Edit>DocumentLibraryForm</Edit>
-  <New>DocumentLibraryForm</New>
-</FormTemplates>
-</file>
-
 <file path=customXml/itemProps1.xml><?xml version="1.0" encoding="utf-8"?>
 <ds:datastoreItem xmlns:ds="http://schemas.openxmlformats.org/officeDocument/2006/customXml" ds:itemID="{14301BBE-1DE1-4D3B-A080-8E78B03DAF12}">
   <ds:schemaRefs>
@@ -5966,6 +6389,14 @@
 </file>
 
 <file path=customXml/itemProps2.xml><?xml version="1.0" encoding="utf-8"?>
+<ds:datastoreItem xmlns:ds="http://schemas.openxmlformats.org/officeDocument/2006/customXml" ds:itemID="{10B90850-C325-47DC-B81D-ED5EE6A09262}">
+  <ds:schemaRefs>
+    <ds:schemaRef ds:uri="http://schemas.microsoft.com/sharepoint/v3/contenttype/forms"/>
+  </ds:schemaRefs>
+</ds:datastoreItem>
+</file>
+
+<file path=customXml/itemProps3.xml><?xml version="1.0" encoding="utf-8"?>
 <ds:datastoreItem xmlns:ds="http://schemas.openxmlformats.org/officeDocument/2006/customXml" ds:itemID="{BDB709B6-BBE8-4869-B5F0-1DF68936842C}">
   <ds:schemaRefs>
     <ds:schemaRef ds:uri="http://schemas.microsoft.com/office/2006/metadata/contentType"/>
@@ -5982,12 +6413,4 @@
     <ds:schemaRef ds:uri="http://schemas.microsoft.com/internal/obd"/>
   </ds:schemaRefs>
 </ds:datastoreItem>
-</file>
-
-<file path=customXml/itemProps3.xml><?xml version="1.0" encoding="utf-8"?>
-<ds:datastoreItem xmlns:ds="http://schemas.openxmlformats.org/officeDocument/2006/customXml" ds:itemID="{10B90850-C325-47DC-B81D-ED5EE6A09262}">
-  <ds:schemaRefs>
-    <ds:schemaRef ds:uri="http://schemas.microsoft.com/sharepoint/v3/contenttype/forms"/>
-  </ds:schemaRefs>
-</ds:datastoreItem>
 </file>
</xml_diff>

<commit_message>
Update #lf(B) - 2
</commit_message>
<xml_diff>
--- a/Doc/PowerPoint/macro.pptx
+++ b/Doc/PowerPoint/macro.pptx
@@ -443,7 +443,7 @@
           <a:p>
             <a:fld id="{9125FC81-E56A-4C2C-BBDE-5F13547EFD5E}" type="datetimeFigureOut">
               <a:rPr lang="ko-KR" altLang="en-US" smtClean="0"/>
-              <a:t>2022-05-17</a:t>
+              <a:t>2022-05-17. Tue</a:t>
             </a:fld>
             <a:endParaRPr lang="ko-KR" altLang="en-US"/>
           </a:p>
@@ -641,7 +641,7 @@
           <a:p>
             <a:fld id="{9125FC81-E56A-4C2C-BBDE-5F13547EFD5E}" type="datetimeFigureOut">
               <a:rPr lang="ko-KR" altLang="en-US" smtClean="0"/>
-              <a:t>2022-05-17</a:t>
+              <a:t>2022-05-17. Tue</a:t>
             </a:fld>
             <a:endParaRPr lang="ko-KR" altLang="en-US"/>
           </a:p>
@@ -849,7 +849,7 @@
           <a:p>
             <a:fld id="{9125FC81-E56A-4C2C-BBDE-5F13547EFD5E}" type="datetimeFigureOut">
               <a:rPr lang="ko-KR" altLang="en-US" smtClean="0"/>
-              <a:t>2022-05-17</a:t>
+              <a:t>2022-05-17. Tue</a:t>
             </a:fld>
             <a:endParaRPr lang="ko-KR" altLang="en-US"/>
           </a:p>
@@ -1047,7 +1047,7 @@
           <a:p>
             <a:fld id="{9125FC81-E56A-4C2C-BBDE-5F13547EFD5E}" type="datetimeFigureOut">
               <a:rPr lang="ko-KR" altLang="en-US" smtClean="0"/>
-              <a:t>2022-05-17</a:t>
+              <a:t>2022-05-17. Tue</a:t>
             </a:fld>
             <a:endParaRPr lang="ko-KR" altLang="en-US"/>
           </a:p>
@@ -1322,7 +1322,7 @@
           <a:p>
             <a:fld id="{9125FC81-E56A-4C2C-BBDE-5F13547EFD5E}" type="datetimeFigureOut">
               <a:rPr lang="ko-KR" altLang="en-US" smtClean="0"/>
-              <a:t>2022-05-17</a:t>
+              <a:t>2022-05-17. Tue</a:t>
             </a:fld>
             <a:endParaRPr lang="ko-KR" altLang="en-US"/>
           </a:p>
@@ -1587,7 +1587,7 @@
           <a:p>
             <a:fld id="{9125FC81-E56A-4C2C-BBDE-5F13547EFD5E}" type="datetimeFigureOut">
               <a:rPr lang="ko-KR" altLang="en-US" smtClean="0"/>
-              <a:t>2022-05-17</a:t>
+              <a:t>2022-05-17. Tue</a:t>
             </a:fld>
             <a:endParaRPr lang="ko-KR" altLang="en-US"/>
           </a:p>
@@ -1999,7 +1999,7 @@
           <a:p>
             <a:fld id="{9125FC81-E56A-4C2C-BBDE-5F13547EFD5E}" type="datetimeFigureOut">
               <a:rPr lang="ko-KR" altLang="en-US" smtClean="0"/>
-              <a:t>2022-05-17</a:t>
+              <a:t>2022-05-17. Tue</a:t>
             </a:fld>
             <a:endParaRPr lang="ko-KR" altLang="en-US"/>
           </a:p>
@@ -2140,7 +2140,7 @@
           <a:p>
             <a:fld id="{9125FC81-E56A-4C2C-BBDE-5F13547EFD5E}" type="datetimeFigureOut">
               <a:rPr lang="ko-KR" altLang="en-US" smtClean="0"/>
-              <a:t>2022-05-17</a:t>
+              <a:t>2022-05-17. Tue</a:t>
             </a:fld>
             <a:endParaRPr lang="ko-KR" altLang="en-US"/>
           </a:p>
@@ -2253,7 +2253,7 @@
           <a:p>
             <a:fld id="{9125FC81-E56A-4C2C-BBDE-5F13547EFD5E}" type="datetimeFigureOut">
               <a:rPr lang="ko-KR" altLang="en-US" smtClean="0"/>
-              <a:t>2022-05-17</a:t>
+              <a:t>2022-05-17. Tue</a:t>
             </a:fld>
             <a:endParaRPr lang="ko-KR" altLang="en-US"/>
           </a:p>
@@ -2564,7 +2564,7 @@
           <a:p>
             <a:fld id="{9125FC81-E56A-4C2C-BBDE-5F13547EFD5E}" type="datetimeFigureOut">
               <a:rPr lang="ko-KR" altLang="en-US" smtClean="0"/>
-              <a:t>2022-05-17</a:t>
+              <a:t>2022-05-17. Tue</a:t>
             </a:fld>
             <a:endParaRPr lang="ko-KR" altLang="en-US"/>
           </a:p>
@@ -2852,7 +2852,7 @@
           <a:p>
             <a:fld id="{9125FC81-E56A-4C2C-BBDE-5F13547EFD5E}" type="datetimeFigureOut">
               <a:rPr lang="ko-KR" altLang="en-US" smtClean="0"/>
-              <a:t>2022-05-17</a:t>
+              <a:t>2022-05-17. Tue</a:t>
             </a:fld>
             <a:endParaRPr lang="ko-KR" altLang="en-US"/>
           </a:p>
@@ -3093,7 +3093,7 @@
           <a:p>
             <a:fld id="{9125FC81-E56A-4C2C-BBDE-5F13547EFD5E}" type="datetimeFigureOut">
               <a:rPr lang="ko-KR" altLang="en-US" smtClean="0"/>
-              <a:t>2022-05-17</a:t>
+              <a:t>2022-05-17. Tue</a:t>
             </a:fld>
             <a:endParaRPr lang="ko-KR" altLang="en-US"/>
           </a:p>
@@ -4719,13 +4719,13 @@
           <a:p>
             <a:r>
               <a:rPr lang="en-US" altLang="ko-KR" dirty="0"/>
-              <a:t>#latch( #(A), #g(B)) &gt; B;</a:t>
+              <a:t>#latch( #g(A), #(B)) &gt; B;</a:t>
             </a:r>
           </a:p>
           <a:p>
             <a:r>
               <a:rPr lang="en-US" altLang="ko-KR" dirty="0"/>
-              <a:t>#latch( #(C), #h(B)) |&gt; B;</a:t>
+              <a:t>#latch( #(C), #(!B)) |&gt; B;</a:t>
             </a:r>
           </a:p>
           <a:p>
@@ -4740,7 +4740,7 @@
           <a:p>
             <a:r>
               <a:rPr lang="en-US" altLang="ko-KR" dirty="0"/>
-              <a:t>(n = #(A) or #(B)) (#M = #g(B) or #h(B))</a:t>
+              <a:t>(n = #(A) or #(B)) (#M = #(B) or #(!B))</a:t>
             </a:r>
           </a:p>
           <a:p>
@@ -6154,18 +6154,18 @@
 </file>
 
 <file path=customXml/item1.xml><?xml version="1.0" encoding="utf-8"?>
-<p:properties xmlns:p="http://schemas.microsoft.com/office/2006/metadata/properties" xmlns:xsi="http://www.w3.org/2001/XMLSchema-instance" xmlns:pc="http://schemas.microsoft.com/office/infopath/2007/PartnerControls">
-  <documentManagement/>
-</p:properties>
-</file>
-
-<file path=customXml/item2.xml><?xml version="1.0" encoding="utf-8"?>
 <?mso-contentType ?>
 <FormTemplates xmlns="http://schemas.microsoft.com/sharepoint/v3/contenttype/forms">
   <Display>DocumentLibraryForm</Display>
   <Edit>DocumentLibraryForm</Edit>
   <New>DocumentLibraryForm</New>
 </FormTemplates>
+</file>
+
+<file path=customXml/item2.xml><?xml version="1.0" encoding="utf-8"?>
+<p:properties xmlns:p="http://schemas.microsoft.com/office/2006/metadata/properties" xmlns:xsi="http://www.w3.org/2001/XMLSchema-instance" xmlns:pc="http://schemas.microsoft.com/office/infopath/2007/PartnerControls">
+  <documentManagement/>
+</p:properties>
 </file>
 
 <file path=customXml/item3.xml><?xml version="1.0" encoding="utf-8"?>
@@ -6372,6 +6372,14 @@
 </file>
 
 <file path=customXml/itemProps1.xml><?xml version="1.0" encoding="utf-8"?>
+<ds:datastoreItem xmlns:ds="http://schemas.openxmlformats.org/officeDocument/2006/customXml" ds:itemID="{10B90850-C325-47DC-B81D-ED5EE6A09262}">
+  <ds:schemaRefs>
+    <ds:schemaRef ds:uri="http://schemas.microsoft.com/sharepoint/v3/contenttype/forms"/>
+  </ds:schemaRefs>
+</ds:datastoreItem>
+</file>
+
+<file path=customXml/itemProps2.xml><?xml version="1.0" encoding="utf-8"?>
 <ds:datastoreItem xmlns:ds="http://schemas.openxmlformats.org/officeDocument/2006/customXml" ds:itemID="{14301BBE-1DE1-4D3B-A080-8E78B03DAF12}">
   <ds:schemaRefs>
     <ds:schemaRef ds:uri="http://schemas.microsoft.com/office/2006/documentManagement/types"/>
@@ -6384,14 +6392,6 @@
     <ds:schemaRef ds:uri="http://schemas.microsoft.com/office/2006/metadata/properties"/>
     <ds:schemaRef ds:uri="http://purl.org/dc/terms/"/>
     <ds:schemaRef ds:uri="http://purl.org/dc/elements/1.1/"/>
-  </ds:schemaRefs>
-</ds:datastoreItem>
-</file>
-
-<file path=customXml/itemProps2.xml><?xml version="1.0" encoding="utf-8"?>
-<ds:datastoreItem xmlns:ds="http://schemas.openxmlformats.org/officeDocument/2006/customXml" ds:itemID="{10B90850-C325-47DC-B81D-ED5EE6A09262}">
-  <ds:schemaRefs>
-    <ds:schemaRef ds:uri="http://schemas.microsoft.com/sharepoint/v3/contenttype/forms"/>
   </ds:schemaRefs>
 </ds:datastoreItem>
 </file>

</xml_diff>

<commit_message>
Fix sf case 1,2
Fix sf case 1,2
</commit_message>
<xml_diff>
--- a/Doc/PowerPoint/macro.pptx
+++ b/Doc/PowerPoint/macro.pptx
@@ -4648,19 +4648,19 @@
           <a:p>
             <a:r>
               <a:rPr lang="en-US" altLang="ko-KR" dirty="0"/>
-              <a:t>S = {_~A~A}</a:t>
+              <a:t>S = {_~A~_}</a:t>
             </a:r>
           </a:p>
           <a:p>
             <a:r>
               <a:rPr lang="en-US" altLang="ko-KR" dirty="0"/>
-              <a:t>R = {_~C~C}</a:t>
+              <a:t>R = {_~C~_}</a:t>
             </a:r>
           </a:p>
           <a:p>
             <a:r>
               <a:rPr lang="en-US" altLang="ko-KR" dirty="0"/>
-              <a:t>E = {_~B~B}</a:t>
+              <a:t>E = {B~B~_}</a:t>
             </a:r>
           </a:p>
           <a:p>
@@ -5108,19 +5108,24 @@
           <a:p>
             <a:r>
               <a:rPr lang="en-US" altLang="ko-KR" dirty="0"/>
-              <a:t>S1 = {_~X,Y?Z~X,Y,Z};</a:t>
+              <a:t>S1 = {_~X,Y?Z~_};</a:t>
             </a:r>
           </a:p>
           <a:p>
             <a:r>
               <a:rPr lang="en-US" altLang="ko-KR" dirty="0"/>
-              <a:t>R = {_~F,I?G~F,I,G};</a:t>
-            </a:r>
+              <a:t>R = {_~F,I?</a:t>
+            </a:r>
+            <a:r>
+              <a:rPr lang="en-US" altLang="ko-KR"/>
+              <a:t>G~_};</a:t>
+            </a:r>
+            <a:endParaRPr lang="en-US" altLang="ko-KR" dirty="0"/>
           </a:p>
           <a:p>
             <a:r>
               <a:rPr lang="en-US" altLang="ko-KR" dirty="0"/>
-              <a:t>E = {_~B,E~B,E}</a:t>
+              <a:t>E = {B,E~B,E~_}</a:t>
             </a:r>
           </a:p>
           <a:p>
@@ -7361,18 +7366,18 @@
 </file>
 
 <file path=customXml/item1.xml><?xml version="1.0" encoding="utf-8"?>
-<p:properties xmlns:p="http://schemas.microsoft.com/office/2006/metadata/properties" xmlns:xsi="http://www.w3.org/2001/XMLSchema-instance" xmlns:pc="http://schemas.microsoft.com/office/infopath/2007/PartnerControls">
-  <documentManagement/>
-</p:properties>
-</file>
-
-<file path=customXml/item2.xml><?xml version="1.0" encoding="utf-8"?>
 <?mso-contentType ?>
 <FormTemplates xmlns="http://schemas.microsoft.com/sharepoint/v3/contenttype/forms">
   <Display>DocumentLibraryForm</Display>
   <Edit>DocumentLibraryForm</Edit>
   <New>DocumentLibraryForm</New>
 </FormTemplates>
+</file>
+
+<file path=customXml/item2.xml><?xml version="1.0" encoding="utf-8"?>
+<p:properties xmlns:p="http://schemas.microsoft.com/office/2006/metadata/properties" xmlns:xsi="http://www.w3.org/2001/XMLSchema-instance" xmlns:pc="http://schemas.microsoft.com/office/infopath/2007/PartnerControls">
+  <documentManagement/>
+</p:properties>
 </file>
 
 <file path=customXml/item3.xml><?xml version="1.0" encoding="utf-8"?>
@@ -7579,6 +7584,14 @@
 </file>
 
 <file path=customXml/itemProps1.xml><?xml version="1.0" encoding="utf-8"?>
+<ds:datastoreItem xmlns:ds="http://schemas.openxmlformats.org/officeDocument/2006/customXml" ds:itemID="{10B90850-C325-47DC-B81D-ED5EE6A09262}">
+  <ds:schemaRefs>
+    <ds:schemaRef ds:uri="http://schemas.microsoft.com/sharepoint/v3/contenttype/forms"/>
+  </ds:schemaRefs>
+</ds:datastoreItem>
+</file>
+
+<file path=customXml/itemProps2.xml><?xml version="1.0" encoding="utf-8"?>
 <ds:datastoreItem xmlns:ds="http://schemas.openxmlformats.org/officeDocument/2006/customXml" ds:itemID="{14301BBE-1DE1-4D3B-A080-8E78B03DAF12}">
   <ds:schemaRefs>
     <ds:schemaRef ds:uri="http://schemas.microsoft.com/office/2006/documentManagement/types"/>
@@ -7591,14 +7604,6 @@
     <ds:schemaRef ds:uri="http://schemas.microsoft.com/office/2006/metadata/properties"/>
     <ds:schemaRef ds:uri="http://purl.org/dc/terms/"/>
     <ds:schemaRef ds:uri="http://purl.org/dc/elements/1.1/"/>
-  </ds:schemaRefs>
-</ds:datastoreItem>
-</file>
-
-<file path=customXml/itemProps2.xml><?xml version="1.0" encoding="utf-8"?>
-<ds:datastoreItem xmlns:ds="http://schemas.openxmlformats.org/officeDocument/2006/customXml" ds:itemID="{10B90850-C325-47DC-B81D-ED5EE6A09262}">
-  <ds:schemaRefs>
-    <ds:schemaRef ds:uri="http://schemas.microsoft.com/sharepoint/v3/contenttype/forms"/>
   </ds:schemaRefs>
 </ds:datastoreItem>
 </file>

</xml_diff>

<commit_message>
Update ds 1.0.25 pre
</commit_message>
<xml_diff>
--- a/Doc/PowerPoint/macro.pptx
+++ b/Doc/PowerPoint/macro.pptx
@@ -8860,7 +8860,9 @@
         </p:nvSpPr>
         <p:spPr/>
         <p:txBody>
-          <a:bodyPr/>
+          <a:bodyPr>
+            <a:normAutofit lnSpcReduction="10000"/>
+          </a:bodyPr>
           <a:lstStyle/>
           <a:p>
             <a:r>
@@ -8904,16 +8906,29 @@
             </a:r>
             <a:r>
               <a:rPr lang="ko-KR" altLang="en-US" dirty="0"/>
-              <a:t>는 값과 비슷하다</a:t>
-            </a:r>
-            <a:r>
-              <a:rPr lang="en-US" altLang="ko-KR" dirty="0"/>
-              <a:t>. Reset</a:t>
+              <a:t>는 값 매크로와 비슷하다</a:t>
+            </a:r>
+            <a:r>
+              <a:rPr lang="en-US" altLang="ko-KR" dirty="0"/>
+              <a:t>. </a:t>
+            </a:r>
+          </a:p>
+          <a:p>
+            <a:r>
+              <a:rPr lang="en-US" altLang="ko-KR" dirty="0"/>
+              <a:t>Reset</a:t>
             </a:r>
             <a:r>
               <a:rPr lang="ko-KR" altLang="en-US" dirty="0"/>
               <a:t>제어가 가능하다</a:t>
             </a:r>
+            <a:endParaRPr lang="en-US" altLang="ko-KR" dirty="0"/>
+          </a:p>
+          <a:p>
+            <a:endParaRPr lang="en-US" altLang="ko-KR" dirty="0"/>
+          </a:p>
+          <a:p>
+            <a:endParaRPr lang="ko-KR" altLang="en-US" dirty="0"/>
           </a:p>
         </p:txBody>
       </p:sp>
@@ -10475,7 +10490,7 @@
           <a:p>
             <a:r>
               <a:rPr lang="en-US" altLang="ko-KR" b="1" dirty="0"/>
-              <a:t>(A) &gt; @sf(B) &lt;| (C);</a:t>
+              <a:t>A &gt; @sf(B) &lt;| C;</a:t>
             </a:r>
             <a:endParaRPr lang="en-US" altLang="ko-KR" dirty="0"/>
           </a:p>
@@ -11155,7 +11170,7 @@
             <a:pPr lvl="1"/>
             <a:r>
               <a:rPr lang="en-US" altLang="ko-KR" dirty="0"/>
-              <a:t>A &gt; B &lt;| #(!A);                 </a:t>
+              <a:t>A &gt; B &lt;| #(!A) ? #h(A);                 </a:t>
             </a:r>
           </a:p>
           <a:p>
@@ -11657,6 +11672,100 @@
             <a:r>
               <a:rPr lang="en-US" altLang="ko-KR" dirty="0"/>
               <a:t>#(A)</a:t>
+            </a:r>
+            <a:endParaRPr lang="ko-KR" altLang="en-US" dirty="0"/>
+          </a:p>
+        </p:txBody>
+      </p:sp>
+      <p:cxnSp>
+        <p:nvCxnSpPr>
+          <p:cNvPr id="14" name="직선 화살표 연결선 13">
+            <a:extLst>
+              <a:ext uri="{FF2B5EF4-FFF2-40B4-BE49-F238E27FC236}">
+                <a16:creationId xmlns:a16="http://schemas.microsoft.com/office/drawing/2014/main" id="{F2002407-EA27-071A-E5FB-3459405CA4CF}"/>
+              </a:ext>
+            </a:extLst>
+          </p:cNvPr>
+          <p:cNvCxnSpPr>
+            <a:cxnSpLocks/>
+            <a:stCxn id="20" idx="1"/>
+            <a:endCxn id="8" idx="6"/>
+          </p:cNvCxnSpPr>
+          <p:nvPr/>
+        </p:nvCxnSpPr>
+        <p:spPr>
+          <a:xfrm flipH="1">
+            <a:off x="9852842" y="2096551"/>
+            <a:ext cx="594248" cy="0"/>
+          </a:xfrm>
+          <a:prstGeom prst="straightConnector1">
+            <a:avLst/>
+          </a:prstGeom>
+          <a:ln w="19050">
+            <a:prstDash val="dash"/>
+            <a:tailEnd type="triangle"/>
+          </a:ln>
+        </p:spPr>
+        <p:style>
+          <a:lnRef idx="1">
+            <a:schemeClr val="accent1"/>
+          </a:lnRef>
+          <a:fillRef idx="0">
+            <a:schemeClr val="accent1"/>
+          </a:fillRef>
+          <a:effectRef idx="0">
+            <a:schemeClr val="accent1"/>
+          </a:effectRef>
+          <a:fontRef idx="minor">
+            <a:schemeClr val="tx1"/>
+          </a:fontRef>
+        </p:style>
+      </p:cxnSp>
+      <p:sp>
+        <p:nvSpPr>
+          <p:cNvPr id="20" name="TextBox 19">
+            <a:extLst>
+              <a:ext uri="{FF2B5EF4-FFF2-40B4-BE49-F238E27FC236}">
+                <a16:creationId xmlns:a16="http://schemas.microsoft.com/office/drawing/2014/main" id="{FE1AF2F6-8306-7887-98DF-0A2B6E322A54}"/>
+              </a:ext>
+            </a:extLst>
+          </p:cNvPr>
+          <p:cNvSpPr txBox="1"/>
+          <p:nvPr/>
+        </p:nvSpPr>
+        <p:spPr>
+          <a:xfrm>
+            <a:off x="10447090" y="1911885"/>
+            <a:ext cx="1744910" cy="369332"/>
+          </a:xfrm>
+          <a:prstGeom prst="rect">
+            <a:avLst/>
+          </a:prstGeom>
+        </p:spPr>
+        <p:style>
+          <a:lnRef idx="2">
+            <a:schemeClr val="accent1"/>
+          </a:lnRef>
+          <a:fillRef idx="1">
+            <a:schemeClr val="lt1"/>
+          </a:fillRef>
+          <a:effectRef idx="0">
+            <a:schemeClr val="accent1"/>
+          </a:effectRef>
+          <a:fontRef idx="minor">
+            <a:schemeClr val="dk1"/>
+          </a:fontRef>
+        </p:style>
+        <p:txBody>
+          <a:bodyPr wrap="square" rtlCol="0">
+            <a:spAutoFit/>
+          </a:bodyPr>
+          <a:lstStyle/>
+          <a:p>
+            <a:pPr algn="ctr"/>
+            <a:r>
+              <a:rPr lang="en-US" altLang="ko-KR" dirty="0"/>
+              <a:t>#h(A)</a:t>
             </a:r>
             <a:endParaRPr lang="ko-KR" altLang="en-US" dirty="0"/>
           </a:p>
@@ -14377,15 +14486,6 @@
 </file>
 
 <file path=customXml/item1.xml><?xml version="1.0" encoding="utf-8"?>
-<?mso-contentType ?>
-<FormTemplates xmlns="http://schemas.microsoft.com/sharepoint/v3/contenttype/forms">
-  <Display>DocumentLibraryForm</Display>
-  <Edit>DocumentLibraryForm</Edit>
-  <New>DocumentLibraryForm</New>
-</FormTemplates>
-</file>
-
-<file path=customXml/item2.xml><?xml version="1.0" encoding="utf-8"?>
 <ct:contentTypeSchema xmlns:ct="http://schemas.microsoft.com/office/2006/metadata/contentType" xmlns:ma="http://schemas.microsoft.com/office/2006/metadata/properties/metaAttributes" ct:_="" ma:_="" ma:contentTypeName="문서" ma:contentTypeID="0x010100CCDC7B2CC92B2E4F9EAD6B5F64D89946" ma:contentTypeVersion="10" ma:contentTypeDescription="새 문서를 만듭니다." ma:contentTypeScope="" ma:versionID="6b285ce8677c02d1b6911851f69796a4">
   <xsd:schema xmlns:xsd="http://www.w3.org/2001/XMLSchema" xmlns:xs="http://www.w3.org/2001/XMLSchema" xmlns:p="http://schemas.microsoft.com/office/2006/metadata/properties" xmlns:ns3="b1a51043-90a6-4d4d-9c96-5f4e735cff8b" xmlns:ns4="236c9c70-648c-4b13-9c6c-4267382de561" targetNamespace="http://schemas.microsoft.com/office/2006/metadata/properties" ma:root="true" ma:fieldsID="51f01effb9e0b0f7794244462605fab2" ns3:_="" ns4:_="">
     <xsd:import namespace="b1a51043-90a6-4d4d-9c96-5f4e735cff8b"/>
@@ -14588,6 +14688,15 @@
 </ct:contentTypeSchema>
 </file>
 
+<file path=customXml/item2.xml><?xml version="1.0" encoding="utf-8"?>
+<?mso-contentType ?>
+<FormTemplates xmlns="http://schemas.microsoft.com/sharepoint/v3/contenttype/forms">
+  <Display>DocumentLibraryForm</Display>
+  <Edit>DocumentLibraryForm</Edit>
+  <New>DocumentLibraryForm</New>
+</FormTemplates>
+</file>
+
 <file path=customXml/item3.xml><?xml version="1.0" encoding="utf-8"?>
 <p:properties xmlns:p="http://schemas.microsoft.com/office/2006/metadata/properties" xmlns:xsi="http://www.w3.org/2001/XMLSchema-instance" xmlns:pc="http://schemas.microsoft.com/office/infopath/2007/PartnerControls">
   <documentManagement/>
@@ -14595,14 +14704,6 @@
 </file>
 
 <file path=customXml/itemProps1.xml><?xml version="1.0" encoding="utf-8"?>
-<ds:datastoreItem xmlns:ds="http://schemas.openxmlformats.org/officeDocument/2006/customXml" ds:itemID="{10B90850-C325-47DC-B81D-ED5EE6A09262}">
-  <ds:schemaRefs>
-    <ds:schemaRef ds:uri="http://schemas.microsoft.com/sharepoint/v3/contenttype/forms"/>
-  </ds:schemaRefs>
-</ds:datastoreItem>
-</file>
-
-<file path=customXml/itemProps2.xml><?xml version="1.0" encoding="utf-8"?>
 <ds:datastoreItem xmlns:ds="http://schemas.openxmlformats.org/officeDocument/2006/customXml" ds:itemID="{BDB709B6-BBE8-4869-B5F0-1DF68936842C}">
   <ds:schemaRefs>
     <ds:schemaRef ds:uri="http://schemas.microsoft.com/office/2006/metadata/contentType"/>
@@ -14617,6 +14718,14 @@
     <ds:schemaRef ds:uri="http://purl.org/dc/elements/1.1/"/>
     <ds:schemaRef ds:uri="http://purl.org/dc/terms/"/>
     <ds:schemaRef ds:uri="http://schemas.microsoft.com/internal/obd"/>
+  </ds:schemaRefs>
+</ds:datastoreItem>
+</file>
+
+<file path=customXml/itemProps2.xml><?xml version="1.0" encoding="utf-8"?>
+<ds:datastoreItem xmlns:ds="http://schemas.openxmlformats.org/officeDocument/2006/customXml" ds:itemID="{10B90850-C325-47DC-B81D-ED5EE6A09262}">
+  <ds:schemaRefs>
+    <ds:schemaRef ds:uri="http://schemas.microsoft.com/sharepoint/v3/contenttype/forms"/>
   </ds:schemaRefs>
 </ds:datastoreItem>
 </file>

</xml_diff>